<commit_message>
smv tg: update box/tetrahedron figure
Former-commit-id: 9fbca419609c484fe6bd80e235041e38a162a4aa [formerly 27942870acb0ed1d47d486db510376a8c2335265]
Former-commit-id: a25e469b3bfcd82839e2a92213a5b8e0ea70cec9
Former-commit-id: c0dd6f680d85d2e19abcc920b1d84e0c4a225e90
</commit_message>
<xml_diff>
--- a/Manuals/SMV_Technical_Reference_Guide/FIGURES/boxtet_setup.pptx
+++ b/Manuals/SMV_Technical_Reference_Guide/FIGURES/boxtet_setup.pptx
@@ -9,7 +9,7 @@
     <p:sldId id="257" r:id="rId3"/>
   </p:sldIdLst>
   <p:sldSz cx="9144000" cy="6858000" type="screen4x3"/>
-  <p:notesSz cx="6858000" cy="9144000"/>
+  <p:notesSz cx="7004050" cy="9223375"/>
   <p:defaultTextStyle>
     <a:defPPr>
       <a:defRPr lang="en-US"/>
@@ -3542,7 +3542,7 @@
         </p:nvGrpSpPr>
         <p:grpSpPr>
           <a:xfrm>
-            <a:off x="1085850" y="3647276"/>
+            <a:off x="415405" y="3647276"/>
             <a:ext cx="3086100" cy="2820199"/>
             <a:chOff x="1369219" y="380201"/>
             <a:chExt cx="3086100" cy="2820199"/>
@@ -3980,7 +3980,7 @@
         </p:nvGrpSpPr>
         <p:grpSpPr>
           <a:xfrm>
-            <a:off x="5562600" y="381799"/>
+            <a:off x="5562600" y="152400"/>
             <a:ext cx="3086100" cy="2820199"/>
             <a:chOff x="1369219" y="380201"/>
             <a:chExt cx="3086100" cy="2820199"/>
@@ -4418,7 +4418,7 @@
         </p:nvSpPr>
         <p:spPr>
           <a:xfrm>
-            <a:off x="3175520" y="6482060"/>
+            <a:off x="2505075" y="6482060"/>
             <a:ext cx="405880" cy="369332"/>
           </a:xfrm>
           <a:prstGeom prst="rect">
@@ -4448,7 +4448,7 @@
         </p:nvSpPr>
         <p:spPr>
           <a:xfrm>
-            <a:off x="670445" y="6482060"/>
+            <a:off x="0" y="6482060"/>
             <a:ext cx="405880" cy="369332"/>
           </a:xfrm>
           <a:prstGeom prst="rect">
@@ -4478,7 +4478,7 @@
         </p:nvSpPr>
         <p:spPr>
           <a:xfrm>
-            <a:off x="4204364" y="5486400"/>
+            <a:off x="3533919" y="5486400"/>
             <a:ext cx="405880" cy="369332"/>
           </a:xfrm>
           <a:prstGeom prst="rect">
@@ -4508,7 +4508,7 @@
         </p:nvSpPr>
         <p:spPr>
           <a:xfrm>
-            <a:off x="1679705" y="5486400"/>
+            <a:off x="1009260" y="5486400"/>
             <a:ext cx="405880" cy="369332"/>
           </a:xfrm>
           <a:prstGeom prst="rect">
@@ -4538,7 +4538,7 @@
         </p:nvSpPr>
         <p:spPr>
           <a:xfrm>
-            <a:off x="3175520" y="4306644"/>
+            <a:off x="2505075" y="4306644"/>
             <a:ext cx="405880" cy="369332"/>
           </a:xfrm>
           <a:prstGeom prst="rect">
@@ -4568,7 +4568,7 @@
         </p:nvSpPr>
         <p:spPr>
           <a:xfrm>
-            <a:off x="670445" y="4306644"/>
+            <a:off x="0" y="4306644"/>
             <a:ext cx="405880" cy="369332"/>
           </a:xfrm>
           <a:prstGeom prst="rect">
@@ -4598,7 +4598,7 @@
         </p:nvSpPr>
         <p:spPr>
           <a:xfrm>
-            <a:off x="4204364" y="3464208"/>
+            <a:off x="3533919" y="3464208"/>
             <a:ext cx="405880" cy="369332"/>
           </a:xfrm>
           <a:prstGeom prst="rect">
@@ -4628,7 +4628,7 @@
         </p:nvSpPr>
         <p:spPr>
           <a:xfrm>
-            <a:off x="1679705" y="3464208"/>
+            <a:off x="1009260" y="3464208"/>
             <a:ext cx="405880" cy="369332"/>
           </a:xfrm>
           <a:prstGeom prst="rect">
@@ -5018,7 +5018,7 @@
         </p:nvSpPr>
         <p:spPr>
           <a:xfrm>
-            <a:off x="5867574" y="1688068"/>
+            <a:off x="5867574" y="1458669"/>
             <a:ext cx="423514" cy="369332"/>
           </a:xfrm>
           <a:prstGeom prst="rect">
@@ -5048,7 +5048,7 @@
         </p:nvSpPr>
         <p:spPr>
           <a:xfrm>
-            <a:off x="6874843" y="1797383"/>
+            <a:off x="6874843" y="1567984"/>
             <a:ext cx="423514" cy="369332"/>
           </a:xfrm>
           <a:prstGeom prst="rect">
@@ -5078,7 +5078,7 @@
         </p:nvSpPr>
         <p:spPr>
           <a:xfrm>
-            <a:off x="7928517" y="1688068"/>
+            <a:off x="7928517" y="1458669"/>
             <a:ext cx="423514" cy="369332"/>
           </a:xfrm>
           <a:prstGeom prst="rect">
@@ -5108,7 +5108,7 @@
         </p:nvSpPr>
         <p:spPr>
           <a:xfrm>
-            <a:off x="6993557" y="592743"/>
+            <a:off x="6993557" y="363344"/>
             <a:ext cx="423514" cy="369332"/>
           </a:xfrm>
           <a:prstGeom prst="rect">
@@ -5138,7 +5138,7 @@
         </p:nvSpPr>
         <p:spPr>
           <a:xfrm>
-            <a:off x="6900514" y="2647201"/>
+            <a:off x="6900514" y="2417802"/>
             <a:ext cx="423514" cy="369332"/>
           </a:xfrm>
           <a:prstGeom prst="rect">
@@ -5168,7 +5168,7 @@
         </p:nvSpPr>
         <p:spPr>
           <a:xfrm>
-            <a:off x="7145957" y="1312153"/>
+            <a:off x="7145957" y="1082754"/>
             <a:ext cx="423514" cy="369332"/>
           </a:xfrm>
           <a:prstGeom prst="rect">
@@ -5187,6 +5187,239 @@
               <a:t>p3</a:t>
             </a:r>
             <a:endParaRPr lang="en-US" dirty="0"/>
+          </a:p>
+        </p:txBody>
+      </p:sp>
+      <p:sp>
+        <p:nvSpPr>
+          <p:cNvPr id="95" name="TextBox 94"/>
+          <p:cNvSpPr txBox="1"/>
+          <p:nvPr/>
+        </p:nvSpPr>
+        <p:spPr>
+          <a:xfrm>
+            <a:off x="4101895" y="4303752"/>
+            <a:ext cx="1058303" cy="2031325"/>
+          </a:xfrm>
+          <a:prstGeom prst="rect">
+            <a:avLst/>
+          </a:prstGeom>
+          <a:noFill/>
+        </p:spPr>
+        <p:txBody>
+          <a:bodyPr wrap="none" rtlCol="0">
+            <a:spAutoFit/>
+          </a:bodyPr>
+          <a:lstStyle/>
+          <a:p>
+            <a:r>
+              <a:rPr lang="en-US" dirty="0" smtClean="0"/>
+              <a:t>P-&gt;v</a:t>
+            </a:r>
+          </a:p>
+          <a:p>
+            <a:r>
+              <a:rPr lang="en-US" dirty="0" smtClean="0"/>
+              <a:t>0: 0,2,4,6</a:t>
+            </a:r>
+          </a:p>
+          <a:p>
+            <a:r>
+              <a:rPr lang="en-US" dirty="0" smtClean="0"/>
+              <a:t>1: 1,3,5,7</a:t>
+            </a:r>
+          </a:p>
+          <a:p>
+            <a:r>
+              <a:rPr lang="en-US" dirty="0" smtClean="0"/>
+              <a:t>2: 0,1,4,5</a:t>
+            </a:r>
+          </a:p>
+          <a:p>
+            <a:r>
+              <a:rPr lang="en-US" dirty="0" smtClean="0"/>
+              <a:t>3: 2,3,6,7</a:t>
+            </a:r>
+          </a:p>
+          <a:p>
+            <a:r>
+              <a:rPr lang="en-US" dirty="0" smtClean="0"/>
+              <a:t>4: 0,1,2,3</a:t>
+            </a:r>
+          </a:p>
+          <a:p>
+            <a:r>
+              <a:rPr lang="en-US" dirty="0" smtClean="0"/>
+              <a:t>5: 4,5,6,7</a:t>
+            </a:r>
+            <a:endParaRPr lang="en-US" dirty="0"/>
+          </a:p>
+        </p:txBody>
+      </p:sp>
+      <p:sp>
+        <p:nvSpPr>
+          <p:cNvPr id="96" name="TextBox 95"/>
+          <p:cNvSpPr txBox="1"/>
+          <p:nvPr/>
+        </p:nvSpPr>
+        <p:spPr>
+          <a:xfrm>
+            <a:off x="5301340" y="4306978"/>
+            <a:ext cx="1292341" cy="2031325"/>
+          </a:xfrm>
+          <a:prstGeom prst="rect">
+            <a:avLst/>
+          </a:prstGeom>
+          <a:noFill/>
+        </p:spPr>
+        <p:txBody>
+          <a:bodyPr wrap="none" rtlCol="0">
+            <a:spAutoFit/>
+          </a:bodyPr>
+          <a:lstStyle/>
+          <a:p>
+            <a:r>
+              <a:rPr lang="en-US" dirty="0" smtClean="0"/>
+              <a:t>P-&gt;e</a:t>
+            </a:r>
+          </a:p>
+          <a:p>
+            <a:r>
+              <a:rPr lang="en-US" dirty="0" smtClean="0"/>
+              <a:t>0: 0,2,8,10</a:t>
+            </a:r>
+          </a:p>
+          <a:p>
+            <a:r>
+              <a:rPr lang="en-US" dirty="0" smtClean="0"/>
+              <a:t>1: 1,3,9,11</a:t>
+            </a:r>
+          </a:p>
+          <a:p>
+            <a:r>
+              <a:rPr lang="en-US" dirty="0" smtClean="0"/>
+              <a:t>2: 4,6,8,9</a:t>
+            </a:r>
+          </a:p>
+          <a:p>
+            <a:r>
+              <a:rPr lang="en-US" dirty="0" smtClean="0"/>
+              <a:t>3: 5,7,10,11</a:t>
+            </a:r>
+          </a:p>
+          <a:p>
+            <a:r>
+              <a:rPr lang="en-US" dirty="0" smtClean="0"/>
+              <a:t>4: 0,1,4,5</a:t>
+            </a:r>
+          </a:p>
+          <a:p>
+            <a:r>
+              <a:rPr lang="en-US" dirty="0" smtClean="0"/>
+              <a:t>5: 2,3,6,7</a:t>
+            </a:r>
+            <a:endParaRPr lang="en-US" dirty="0"/>
+          </a:p>
+        </p:txBody>
+      </p:sp>
+      <p:sp>
+        <p:nvSpPr>
+          <p:cNvPr id="97" name="TextBox 96"/>
+          <p:cNvSpPr txBox="1"/>
+          <p:nvPr/>
+        </p:nvSpPr>
+        <p:spPr>
+          <a:xfrm>
+            <a:off x="6815641" y="3158073"/>
+            <a:ext cx="825867" cy="3693319"/>
+          </a:xfrm>
+          <a:prstGeom prst="rect">
+            <a:avLst/>
+          </a:prstGeom>
+          <a:noFill/>
+        </p:spPr>
+        <p:txBody>
+          <a:bodyPr wrap="none" rtlCol="0">
+            <a:spAutoFit/>
+          </a:bodyPr>
+          <a:lstStyle/>
+          <a:p>
+            <a:r>
+              <a:rPr lang="en-US" dirty="0" smtClean="0"/>
+              <a:t>e-&gt;v</a:t>
+            </a:r>
+          </a:p>
+          <a:p>
+            <a:r>
+              <a:rPr lang="en-US" dirty="0" smtClean="0"/>
+              <a:t>0: 0,2 </a:t>
+            </a:r>
+          </a:p>
+          <a:p>
+            <a:r>
+              <a:rPr lang="en-US" dirty="0" smtClean="0"/>
+              <a:t>1: 1,3</a:t>
+            </a:r>
+          </a:p>
+          <a:p>
+            <a:r>
+              <a:rPr lang="en-US" dirty="0" smtClean="0"/>
+              <a:t>2: 4,6</a:t>
+            </a:r>
+          </a:p>
+          <a:p>
+            <a:r>
+              <a:rPr lang="en-US" dirty="0" smtClean="0"/>
+              <a:t>3: 5,7</a:t>
+            </a:r>
+          </a:p>
+          <a:p>
+            <a:r>
+              <a:rPr lang="en-US" dirty="0" smtClean="0"/>
+              <a:t>4: 0,1</a:t>
+            </a:r>
+          </a:p>
+          <a:p>
+            <a:r>
+              <a:rPr lang="en-US" dirty="0" smtClean="0"/>
+              <a:t>5: 2,3</a:t>
+            </a:r>
+          </a:p>
+          <a:p>
+            <a:r>
+              <a:rPr lang="en-US" dirty="0" smtClean="0"/>
+              <a:t>6: 4,5</a:t>
+            </a:r>
+          </a:p>
+          <a:p>
+            <a:r>
+              <a:rPr lang="en-US" dirty="0" smtClean="0"/>
+              <a:t>7: 6,7</a:t>
+            </a:r>
+          </a:p>
+          <a:p>
+            <a:r>
+              <a:rPr lang="en-US" dirty="0" smtClean="0"/>
+              <a:t>8: 0,4</a:t>
+            </a:r>
+          </a:p>
+          <a:p>
+            <a:r>
+              <a:rPr lang="en-US" dirty="0" smtClean="0"/>
+              <a:t>9: 1,5</a:t>
+            </a:r>
+          </a:p>
+          <a:p>
+            <a:r>
+              <a:rPr lang="en-US" dirty="0" smtClean="0"/>
+              <a:t>10: 2,6</a:t>
+            </a:r>
+          </a:p>
+          <a:p>
+            <a:r>
+              <a:rPr lang="en-US" dirty="0" smtClean="0"/>
+              <a:t>11: 3,7</a:t>
+            </a:r>
           </a:p>
         </p:txBody>
       </p:sp>
@@ -6252,6 +6485,179 @@
               <a:t>e4</a:t>
             </a:r>
             <a:endParaRPr lang="en-US" dirty="0"/>
+          </a:p>
+        </p:txBody>
+      </p:sp>
+      <p:sp>
+        <p:nvSpPr>
+          <p:cNvPr id="4" name="TextBox 3"/>
+          <p:cNvSpPr txBox="1"/>
+          <p:nvPr/>
+        </p:nvSpPr>
+        <p:spPr>
+          <a:xfrm>
+            <a:off x="4816012" y="3769874"/>
+            <a:ext cx="883575" cy="1477328"/>
+          </a:xfrm>
+          <a:prstGeom prst="rect">
+            <a:avLst/>
+          </a:prstGeom>
+          <a:noFill/>
+        </p:spPr>
+        <p:txBody>
+          <a:bodyPr wrap="none" rtlCol="0">
+            <a:spAutoFit/>
+          </a:bodyPr>
+          <a:lstStyle/>
+          <a:p>
+            <a:r>
+              <a:rPr lang="en-US" dirty="0" smtClean="0"/>
+              <a:t>P-&gt;v</a:t>
+            </a:r>
+          </a:p>
+          <a:p>
+            <a:r>
+              <a:rPr lang="en-US" dirty="0" smtClean="0"/>
+              <a:t>0: 1,0,3</a:t>
+            </a:r>
+          </a:p>
+          <a:p>
+            <a:r>
+              <a:rPr lang="en-US" dirty="0" smtClean="0"/>
+              <a:t>1: 2,1,3</a:t>
+            </a:r>
+          </a:p>
+          <a:p>
+            <a:r>
+              <a:rPr lang="en-US" dirty="0" smtClean="0"/>
+              <a:t>2: 0,2,3</a:t>
+            </a:r>
+          </a:p>
+          <a:p>
+            <a:r>
+              <a:rPr lang="en-US" dirty="0" smtClean="0"/>
+              <a:t>3: 0,2,1</a:t>
+            </a:r>
+            <a:endParaRPr lang="en-US" dirty="0"/>
+          </a:p>
+        </p:txBody>
+      </p:sp>
+      <p:sp>
+        <p:nvSpPr>
+          <p:cNvPr id="39" name="TextBox 38"/>
+          <p:cNvSpPr txBox="1"/>
+          <p:nvPr/>
+        </p:nvSpPr>
+        <p:spPr>
+          <a:xfrm>
+            <a:off x="5808541" y="3858418"/>
+            <a:ext cx="883575" cy="1477328"/>
+          </a:xfrm>
+          <a:prstGeom prst="rect">
+            <a:avLst/>
+          </a:prstGeom>
+          <a:noFill/>
+        </p:spPr>
+        <p:txBody>
+          <a:bodyPr wrap="none" rtlCol="0">
+            <a:spAutoFit/>
+          </a:bodyPr>
+          <a:lstStyle/>
+          <a:p>
+            <a:r>
+              <a:rPr lang="en-US" dirty="0" smtClean="0"/>
+              <a:t>P-&gt;e</a:t>
+            </a:r>
+          </a:p>
+          <a:p>
+            <a:r>
+              <a:rPr lang="en-US" dirty="0" smtClean="0"/>
+              <a:t>0: 0,3,4</a:t>
+            </a:r>
+          </a:p>
+          <a:p>
+            <a:r>
+              <a:rPr lang="en-US" dirty="0" smtClean="0"/>
+              <a:t>1: 1,4,5</a:t>
+            </a:r>
+          </a:p>
+          <a:p>
+            <a:r>
+              <a:rPr lang="en-US" dirty="0" smtClean="0"/>
+              <a:t>2: 2,3,5</a:t>
+            </a:r>
+          </a:p>
+          <a:p>
+            <a:r>
+              <a:rPr lang="en-US" dirty="0" smtClean="0"/>
+              <a:t>3: 0,1,2</a:t>
+            </a:r>
+            <a:endParaRPr lang="en-US" dirty="0"/>
+          </a:p>
+        </p:txBody>
+      </p:sp>
+      <p:sp>
+        <p:nvSpPr>
+          <p:cNvPr id="40" name="TextBox 39"/>
+          <p:cNvSpPr txBox="1"/>
+          <p:nvPr/>
+        </p:nvSpPr>
+        <p:spPr>
+          <a:xfrm>
+            <a:off x="6900668" y="3768368"/>
+            <a:ext cx="883612" cy="2031325"/>
+          </a:xfrm>
+          <a:prstGeom prst="rect">
+            <a:avLst/>
+          </a:prstGeom>
+          <a:noFill/>
+        </p:spPr>
+        <p:txBody>
+          <a:bodyPr wrap="square" rtlCol="0">
+            <a:spAutoFit/>
+          </a:bodyPr>
+          <a:lstStyle/>
+          <a:p>
+            <a:r>
+              <a:rPr lang="en-US" dirty="0" smtClean="0"/>
+              <a:t>e-&gt;v</a:t>
+            </a:r>
+          </a:p>
+          <a:p>
+            <a:r>
+              <a:rPr lang="en-US" dirty="0" smtClean="0"/>
+              <a:t>0: 0,1</a:t>
+            </a:r>
+          </a:p>
+          <a:p>
+            <a:r>
+              <a:rPr lang="en-US" dirty="0" smtClean="0"/>
+              <a:t>1: 1,3</a:t>
+            </a:r>
+          </a:p>
+          <a:p>
+            <a:r>
+              <a:rPr lang="en-US" dirty="0" smtClean="0"/>
+              <a:t>2: 2,0</a:t>
+            </a:r>
+          </a:p>
+          <a:p>
+            <a:r>
+              <a:rPr lang="en-US" dirty="0" smtClean="0"/>
+              <a:t>3: 0,3</a:t>
+            </a:r>
+          </a:p>
+          <a:p>
+            <a:r>
+              <a:rPr lang="en-US" dirty="0" smtClean="0"/>
+              <a:t>4: 1,3</a:t>
+            </a:r>
+          </a:p>
+          <a:p>
+            <a:r>
+              <a:rPr lang="en-US" dirty="0" smtClean="0"/>
+              <a:t>5: 2,3</a:t>
+            </a:r>
           </a:p>
         </p:txBody>
       </p:sp>

</xml_diff>

<commit_message>
smokeview source: interim tetra box update
Former-commit-id: 53a5f36b54b4d3eebbb07533899009c0924489c5 [formerly 25cd05a27a71d83a9dbf28c696b5a92459733ea2]
Former-commit-id: 2f5fa02f063dc65f566a10ebdb2637e8b6860850
Former-commit-id: c2702a42251a785fbd4a71b76069786a2b22ab98
</commit_message>
<xml_diff>
--- a/Manuals/SMV_Technical_Reference_Guide/FIGURES/boxtet_setup.pptx
+++ b/Manuals/SMV_Technical_Reference_Guide/FIGURES/boxtet_setup.pptx
@@ -289,7 +289,7 @@
           <a:p>
             <a:fld id="{E845A241-6C36-4F86-A295-72BE1E1162DC}" type="datetimeFigureOut">
               <a:rPr lang="en-US" smtClean="0"/>
-              <a:t>6/7/2013</a:t>
+              <a:t>6/10/2013</a:t>
             </a:fld>
             <a:endParaRPr lang="en-US"/>
           </a:p>
@@ -459,7 +459,7 @@
           <a:p>
             <a:fld id="{E845A241-6C36-4F86-A295-72BE1E1162DC}" type="datetimeFigureOut">
               <a:rPr lang="en-US" smtClean="0"/>
-              <a:t>6/7/2013</a:t>
+              <a:t>6/10/2013</a:t>
             </a:fld>
             <a:endParaRPr lang="en-US"/>
           </a:p>
@@ -639,7 +639,7 @@
           <a:p>
             <a:fld id="{E845A241-6C36-4F86-A295-72BE1E1162DC}" type="datetimeFigureOut">
               <a:rPr lang="en-US" smtClean="0"/>
-              <a:t>6/7/2013</a:t>
+              <a:t>6/10/2013</a:t>
             </a:fld>
             <a:endParaRPr lang="en-US"/>
           </a:p>
@@ -809,7 +809,7 @@
           <a:p>
             <a:fld id="{E845A241-6C36-4F86-A295-72BE1E1162DC}" type="datetimeFigureOut">
               <a:rPr lang="en-US" smtClean="0"/>
-              <a:t>6/7/2013</a:t>
+              <a:t>6/10/2013</a:t>
             </a:fld>
             <a:endParaRPr lang="en-US"/>
           </a:p>
@@ -1055,7 +1055,7 @@
           <a:p>
             <a:fld id="{E845A241-6C36-4F86-A295-72BE1E1162DC}" type="datetimeFigureOut">
               <a:rPr lang="en-US" smtClean="0"/>
-              <a:t>6/7/2013</a:t>
+              <a:t>6/10/2013</a:t>
             </a:fld>
             <a:endParaRPr lang="en-US"/>
           </a:p>
@@ -1343,7 +1343,7 @@
           <a:p>
             <a:fld id="{E845A241-6C36-4F86-A295-72BE1E1162DC}" type="datetimeFigureOut">
               <a:rPr lang="en-US" smtClean="0"/>
-              <a:t>6/7/2013</a:t>
+              <a:t>6/10/2013</a:t>
             </a:fld>
             <a:endParaRPr lang="en-US"/>
           </a:p>
@@ -1765,7 +1765,7 @@
           <a:p>
             <a:fld id="{E845A241-6C36-4F86-A295-72BE1E1162DC}" type="datetimeFigureOut">
               <a:rPr lang="en-US" smtClean="0"/>
-              <a:t>6/7/2013</a:t>
+              <a:t>6/10/2013</a:t>
             </a:fld>
             <a:endParaRPr lang="en-US"/>
           </a:p>
@@ -1883,7 +1883,7 @@
           <a:p>
             <a:fld id="{E845A241-6C36-4F86-A295-72BE1E1162DC}" type="datetimeFigureOut">
               <a:rPr lang="en-US" smtClean="0"/>
-              <a:t>6/7/2013</a:t>
+              <a:t>6/10/2013</a:t>
             </a:fld>
             <a:endParaRPr lang="en-US"/>
           </a:p>
@@ -1978,7 +1978,7 @@
           <a:p>
             <a:fld id="{E845A241-6C36-4F86-A295-72BE1E1162DC}" type="datetimeFigureOut">
               <a:rPr lang="en-US" smtClean="0"/>
-              <a:t>6/7/2013</a:t>
+              <a:t>6/10/2013</a:t>
             </a:fld>
             <a:endParaRPr lang="en-US"/>
           </a:p>
@@ -2255,7 +2255,7 @@
           <a:p>
             <a:fld id="{E845A241-6C36-4F86-A295-72BE1E1162DC}" type="datetimeFigureOut">
               <a:rPr lang="en-US" smtClean="0"/>
-              <a:t>6/7/2013</a:t>
+              <a:t>6/10/2013</a:t>
             </a:fld>
             <a:endParaRPr lang="en-US"/>
           </a:p>
@@ -2508,7 +2508,7 @@
           <a:p>
             <a:fld id="{E845A241-6C36-4F86-A295-72BE1E1162DC}" type="datetimeFigureOut">
               <a:rPr lang="en-US" smtClean="0"/>
-              <a:t>6/7/2013</a:t>
+              <a:t>6/10/2013</a:t>
             </a:fld>
             <a:endParaRPr lang="en-US"/>
           </a:p>
@@ -2721,7 +2721,7 @@
           <a:p>
             <a:fld id="{E845A241-6C36-4F86-A295-72BE1E1162DC}" type="datetimeFigureOut">
               <a:rPr lang="en-US" smtClean="0"/>
-              <a:t>6/7/2013</a:t>
+              <a:t>6/10/2013</a:t>
             </a:fld>
             <a:endParaRPr lang="en-US"/>
           </a:p>
@@ -6518,25 +6518,44 @@
           <a:p>
             <a:r>
               <a:rPr lang="en-US" dirty="0" smtClean="0"/>
-              <a:t>0: 1,0,3</a:t>
-            </a:r>
-          </a:p>
-          <a:p>
-            <a:r>
-              <a:rPr lang="en-US" dirty="0" smtClean="0"/>
-              <a:t>1: 2,1,3</a:t>
-            </a:r>
-          </a:p>
-          <a:p>
-            <a:r>
-              <a:rPr lang="en-US" dirty="0" smtClean="0"/>
-              <a:t>2: 0,2,3</a:t>
-            </a:r>
-          </a:p>
-          <a:p>
-            <a:r>
-              <a:rPr lang="en-US" dirty="0" smtClean="0"/>
-              <a:t>3: 0,2,1</a:t>
+              <a:t>0: </a:t>
+            </a:r>
+            <a:r>
+              <a:rPr lang="en-US" dirty="0" smtClean="0"/>
+              <a:t>0,3,1</a:t>
+            </a:r>
+            <a:endParaRPr lang="en-US" dirty="0" smtClean="0"/>
+          </a:p>
+          <a:p>
+            <a:r>
+              <a:rPr lang="en-US" dirty="0" smtClean="0"/>
+              <a:t>1: </a:t>
+            </a:r>
+            <a:r>
+              <a:rPr lang="en-US" dirty="0" smtClean="0"/>
+              <a:t>1,3,2</a:t>
+            </a:r>
+            <a:endParaRPr lang="en-US" dirty="0" smtClean="0"/>
+          </a:p>
+          <a:p>
+            <a:r>
+              <a:rPr lang="en-US" dirty="0" smtClean="0"/>
+              <a:t>2: </a:t>
+            </a:r>
+            <a:r>
+              <a:rPr lang="en-US" dirty="0" smtClean="0"/>
+              <a:t>0,2,3</a:t>
+            </a:r>
+            <a:endParaRPr lang="en-US" dirty="0" smtClean="0"/>
+          </a:p>
+          <a:p>
+            <a:r>
+              <a:rPr lang="en-US" dirty="0" smtClean="0"/>
+              <a:t>3: </a:t>
+            </a:r>
+            <a:r>
+              <a:rPr lang="en-US" dirty="0" smtClean="0"/>
+              <a:t>0,1,2</a:t>
             </a:r>
             <a:endParaRPr lang="en-US" dirty="0"/>
           </a:p>
@@ -6632,8 +6651,13 @@
           <a:p>
             <a:r>
               <a:rPr lang="en-US" dirty="0" smtClean="0"/>
-              <a:t>1: 1,3</a:t>
-            </a:r>
+              <a:t>1: </a:t>
+            </a:r>
+            <a:r>
+              <a:rPr lang="en-US" dirty="0" smtClean="0"/>
+              <a:t>1,2</a:t>
+            </a:r>
+            <a:endParaRPr lang="en-US" dirty="0" smtClean="0"/>
           </a:p>
           <a:p>
             <a:r>

</xml_diff>